<commit_message>
# Adopted MobileNet Classifier
1. As title
</commit_message>
<xml_diff>
--- a/Kitchen_Assist_Workflow.pptx
+++ b/Kitchen_Assist_Workflow.pptx
@@ -9,6 +9,8 @@
     <p:sldId id="257" r:id="rId8"/>
     <p:sldId id="258" r:id="rId9"/>
     <p:sldId id="259" r:id="rId10"/>
+    <p:sldId id="260" r:id="rId11"/>
+    <p:sldId id="261" r:id="rId12"/>
   </p:sldIdLst>
   <p:sldSz cx="12188952" cy="6858000" type="screen4x3"/>
   <p:notesSz cx="6858000" cy="9144000"/>
@@ -3162,7 +3164,154 @@
                   <a:srgbClr val="646464"/>
                 </a:solidFill>
               </a:rPr>
-              <a:t>AI-Powered Kitchen Safety Workflow</a:t>
+              <a:t>MobileNet v2 Powered Kitchen Safety Detection</a:t>
+            </a:r>
+          </a:p>
+        </p:txBody>
+      </p:sp>
+      <p:sp>
+        <p:nvSpPr>
+          <p:cNvPr id="4" name="Rounded Rectangle 3"/>
+          <p:cNvSpPr/>
+          <p:nvPr/>
+        </p:nvSpPr>
+        <p:spPr>
+          <a:xfrm>
+            <a:off x="2286000" y="4389120"/>
+            <a:ext cx="2286000" cy="548640"/>
+          </a:xfrm>
+          <a:prstGeom prst="roundRect">
+            <a:avLst/>
+          </a:prstGeom>
+          <a:solidFill>
+            <a:srgbClr val="4CAF50"/>
+          </a:solidFill>
+          <a:ln/>
+        </p:spPr>
+        <p:style>
+          <a:lnRef idx="1">
+            <a:schemeClr val="accent1"/>
+          </a:lnRef>
+          <a:fillRef idx="3">
+            <a:schemeClr val="accent1"/>
+          </a:fillRef>
+          <a:effectRef idx="2">
+            <a:schemeClr val="accent1"/>
+          </a:effectRef>
+          <a:fontRef idx="minor">
+            <a:schemeClr val="lt1"/>
+          </a:fontRef>
+        </p:style>
+        <p:txBody>
+          <a:bodyPr rtlCol="0" anchor="ctr"/>
+          <a:lstStyle/>
+          <a:p>
+            <a:pPr algn="ctr"/>
+            <a:r>
+              <a:rPr sz="1300" b="1">
+                <a:solidFill>
+                  <a:srgbClr val="FFFFFF"/>
+                </a:solidFill>
+              </a:rPr>
+              <a:t>100% Training Accuracy</a:t>
+            </a:r>
+          </a:p>
+        </p:txBody>
+      </p:sp>
+      <p:sp>
+        <p:nvSpPr>
+          <p:cNvPr id="5" name="Rounded Rectangle 4"/>
+          <p:cNvSpPr/>
+          <p:nvPr/>
+        </p:nvSpPr>
+        <p:spPr>
+          <a:xfrm>
+            <a:off x="5029200" y="4389120"/>
+            <a:ext cx="2286000" cy="548640"/>
+          </a:xfrm>
+          <a:prstGeom prst="roundRect">
+            <a:avLst/>
+          </a:prstGeom>
+          <a:solidFill>
+            <a:srgbClr val="2196F3"/>
+          </a:solidFill>
+          <a:ln/>
+        </p:spPr>
+        <p:style>
+          <a:lnRef idx="1">
+            <a:schemeClr val="accent1"/>
+          </a:lnRef>
+          <a:fillRef idx="3">
+            <a:schemeClr val="accent1"/>
+          </a:fillRef>
+          <a:effectRef idx="2">
+            <a:schemeClr val="accent1"/>
+          </a:effectRef>
+          <a:fontRef idx="minor">
+            <a:schemeClr val="lt1"/>
+          </a:fontRef>
+        </p:style>
+        <p:txBody>
+          <a:bodyPr rtlCol="0" anchor="ctr"/>
+          <a:lstStyle/>
+          <a:p>
+            <a:pPr algn="ctr"/>
+            <a:r>
+              <a:rPr sz="1300" b="1">
+                <a:solidFill>
+                  <a:srgbClr val="FFFFFF"/>
+                </a:solidFill>
+              </a:rPr>
+              <a:t>MobileNet v2 - 3.5M Params</a:t>
+            </a:r>
+          </a:p>
+        </p:txBody>
+      </p:sp>
+      <p:sp>
+        <p:nvSpPr>
+          <p:cNvPr id="6" name="Rounded Rectangle 5"/>
+          <p:cNvSpPr/>
+          <p:nvPr/>
+        </p:nvSpPr>
+        <p:spPr>
+          <a:xfrm>
+            <a:off x="7772400" y="4389120"/>
+            <a:ext cx="2286000" cy="548640"/>
+          </a:xfrm>
+          <a:prstGeom prst="roundRect">
+            <a:avLst/>
+          </a:prstGeom>
+          <a:solidFill>
+            <a:srgbClr val="FF9800"/>
+          </a:solidFill>
+          <a:ln/>
+        </p:spPr>
+        <p:style>
+          <a:lnRef idx="1">
+            <a:schemeClr val="accent1"/>
+          </a:lnRef>
+          <a:fillRef idx="3">
+            <a:schemeClr val="accent1"/>
+          </a:fillRef>
+          <a:effectRef idx="2">
+            <a:schemeClr val="accent1"/>
+          </a:effectRef>
+          <a:fontRef idx="minor">
+            <a:schemeClr val="lt1"/>
+          </a:fontRef>
+        </p:style>
+        <p:txBody>
+          <a:bodyPr rtlCol="0" anchor="ctr"/>
+          <a:lstStyle/>
+          <a:p>
+            <a:pPr algn="ctr"/>
+            <a:r>
+              <a:rPr sz="1300" b="1">
+                <a:solidFill>
+                  <a:srgbClr val="FFFFFF"/>
+                </a:solidFill>
+              </a:rPr>
+              <a:t>Color-Optimized Detection</a:t>
             </a:r>
           </a:p>
         </p:txBody>
@@ -3235,7 +3384,7 @@
         </p:nvSpPr>
         <p:spPr>
           <a:xfrm>
-            <a:off x="914400" y="1828800"/>
+            <a:off x="1522476" y="1828800"/>
             <a:ext cx="2011680" cy="914400"/>
           </a:xfrm>
           <a:prstGeom prst="roundRect">
@@ -3299,7 +3448,7 @@
         </p:nvSpPr>
         <p:spPr>
           <a:xfrm>
-            <a:off x="5486400" y="1828800"/>
+            <a:off x="3899916" y="1828800"/>
             <a:ext cx="2011680" cy="914400"/>
           </a:xfrm>
           <a:prstGeom prst="roundRect">
@@ -3363,7 +3512,7 @@
         </p:nvSpPr>
         <p:spPr>
           <a:xfrm>
-            <a:off x="10058400" y="1828800"/>
+            <a:off x="6277356" y="1828800"/>
             <a:ext cx="2011680" cy="914400"/>
           </a:xfrm>
           <a:prstGeom prst="roundRect">
@@ -3414,7 +3563,7 @@
                   <a:srgbClr val="FFFFFF"/>
                 </a:solidFill>
               </a:rPr>
-              <a:t>(ResNet50)</a:t>
+              <a:t>(MobileNet v2)</a:t>
             </a:r>
           </a:p>
         </p:txBody>
@@ -3427,7 +3576,7 @@
         </p:nvSpPr>
         <p:spPr>
           <a:xfrm>
-            <a:off x="14630400" y="1828800"/>
+            <a:off x="8654796" y="1828800"/>
             <a:ext cx="2011680" cy="914400"/>
           </a:xfrm>
           <a:prstGeom prst="roundRect">
@@ -3491,8 +3640,8 @@
         </p:nvCxnSpPr>
         <p:spPr>
           <a:xfrm>
-            <a:off x="2926080" y="2286000.0"/>
-            <a:ext cx="2560320" cy="0.0"/>
+            <a:off x="3534156.0" y="2286000.0"/>
+            <a:ext cx="365760.0" cy="0.0"/>
           </a:xfrm>
           <a:prstGeom prst="line">
             <a:avLst/>
@@ -3526,8 +3675,8 @@
         </p:nvCxnSpPr>
         <p:spPr>
           <a:xfrm>
-            <a:off x="7498080" y="2286000.0"/>
-            <a:ext cx="2560320" cy="0.0"/>
+            <a:off x="5911596.0" y="2286000.0"/>
+            <a:ext cx="365760.0" cy="0.0"/>
           </a:xfrm>
           <a:prstGeom prst="line">
             <a:avLst/>
@@ -3561,8 +3710,8 @@
         </p:nvCxnSpPr>
         <p:spPr>
           <a:xfrm>
-            <a:off x="12070080" y="2286000.0"/>
-            <a:ext cx="2560320" cy="0.0"/>
+            <a:off x="8289036.0" y="2286000.0"/>
+            <a:ext cx="365760.0" cy="0.0"/>
           </a:xfrm>
           <a:prstGeom prst="line">
             <a:avLst/>
@@ -4243,7 +4392,7 @@
                   <a:srgbClr val="000000"/>
                 </a:solidFill>
               </a:rPr>
-              <a:t>(train_classifier.py)</a:t>
+              <a:t>(MobileNet v2)</a:t>
             </a:r>
           </a:p>
         </p:txBody>
@@ -4741,7 +4890,7 @@
                   <a:srgbClr val="003366"/>
                 </a:solidFill>
               </a:rPr>
-              <a:t>🧠 Deep Learning</a:t>
+              <a:t>🧠 Lightweight Model</a:t>
             </a:r>
           </a:p>
           <a:p>
@@ -4752,7 +4901,7 @@
                   <a:srgbClr val="3C3C3C"/>
                 </a:solidFill>
               </a:rPr>
-              <a:t>ResNet50 transfer learning</a:t>
+              <a:t>MobileNet v2 (3.5M params)</a:t>
             </a:r>
           </a:p>
         </p:txBody>
@@ -4816,7 +4965,7 @@
                   <a:srgbClr val="3C3C3C"/>
                 </a:solidFill>
               </a:rPr>
-              <a:t>100% on verification set</a:t>
+              <a:t>100% on training set</a:t>
             </a:r>
           </a:p>
         </p:txBody>
@@ -4933,7 +5082,7 @@
                   <a:srgbClr val="003366"/>
                 </a:solidFill>
               </a:rPr>
-              <a:t>⚡ Real-time Ready</a:t>
+              <a:t>🎨 Color Optimized</a:t>
             </a:r>
           </a:p>
           <a:p>
@@ -4944,7 +5093,7 @@
                   <a:srgbClr val="3C3C3C"/>
                 </a:solidFill>
               </a:rPr>
-              <a:t>Optimized inference pipeline</a:t>
+              <a:t>Preserves critical color features</a:t>
             </a:r>
           </a:p>
         </p:txBody>
@@ -4997,7 +5146,7 @@
                   <a:srgbClr val="003366"/>
                 </a:solidFill>
               </a:rPr>
-              <a:t>📈 Continuous Learning</a:t>
+              <a:t>⚡ Fast Inference</a:t>
             </a:r>
           </a:p>
           <a:p>
@@ -5008,7 +5157,1084 @@
                   <a:srgbClr val="3C3C3C"/>
                 </a:solidFill>
               </a:rPr>
-              <a:t>Easy retraining workflow</a:t>
+              <a:t>Optimized for edge devices</a:t>
+            </a:r>
+          </a:p>
+        </p:txBody>
+      </p:sp>
+    </p:spTree>
+  </p:cSld>
+  <p:clrMapOvr>
+    <a:masterClrMapping/>
+  </p:clrMapOvr>
+</p:sld>
+</file>
+
+<file path=ppt/slides/slide5.xml><?xml version="1.0" encoding="utf-8"?>
+<p:sld xmlns:a="http://schemas.openxmlformats.org/drawingml/2006/main" xmlns:p="http://schemas.openxmlformats.org/presentationml/2006/main" xmlns:r="http://schemas.openxmlformats.org/officeDocument/2006/relationships">
+  <p:cSld>
+    <p:bg>
+      <p:bgPr>
+        <a:solidFill>
+          <a:srgbClr val="FAFAFA"/>
+        </a:solidFill>
+        <a:effectLst/>
+      </p:bgPr>
+    </p:bg>
+    <p:spTree>
+      <p:nvGrpSpPr>
+        <p:cNvPr id="1" name=""/>
+        <p:cNvGrpSpPr/>
+        <p:nvPr/>
+      </p:nvGrpSpPr>
+      <p:grpSpPr/>
+      <p:sp>
+        <p:nvSpPr>
+          <p:cNvPr id="2" name="TextBox 1"/>
+          <p:cNvSpPr txBox="1"/>
+          <p:nvPr/>
+        </p:nvSpPr>
+        <p:spPr>
+          <a:xfrm>
+            <a:off x="457200" y="274320"/>
+            <a:ext cx="11274552" cy="548640"/>
+          </a:xfrm>
+          <a:prstGeom prst="rect">
+            <a:avLst/>
+          </a:prstGeom>
+          <a:noFill/>
+        </p:spPr>
+        <p:txBody>
+          <a:bodyPr wrap="none">
+            <a:spAutoFit/>
+          </a:bodyPr>
+          <a:lstStyle/>
+          <a:p>
+            <a:pPr algn="ctr"/>
+            <a:r>
+              <a:rPr sz="3200" b="1">
+                <a:solidFill>
+                  <a:srgbClr val="003366"/>
+                </a:solidFill>
+              </a:rPr>
+              <a:t>Model Performance &amp; Predictions</a:t>
+            </a:r>
+          </a:p>
+        </p:txBody>
+      </p:sp>
+      <p:sp>
+        <p:nvSpPr>
+          <p:cNvPr id="3" name="Rounded Rectangle 2"/>
+          <p:cNvSpPr/>
+          <p:nvPr/>
+        </p:nvSpPr>
+        <p:spPr>
+          <a:xfrm>
+            <a:off x="731520" y="1097280"/>
+            <a:ext cx="2743200" cy="1097280"/>
+          </a:xfrm>
+          <a:prstGeom prst="roundRect">
+            <a:avLst/>
+          </a:prstGeom>
+          <a:solidFill>
+            <a:srgbClr val="4CAF50"/>
+          </a:solidFill>
+          <a:ln w="25400">
+            <a:solidFill>
+              <a:srgbClr val="388E3C"/>
+            </a:solidFill>
+          </a:ln>
+        </p:spPr>
+        <p:style>
+          <a:lnRef idx="1">
+            <a:schemeClr val="accent1"/>
+          </a:lnRef>
+          <a:fillRef idx="3">
+            <a:schemeClr val="accent1"/>
+          </a:fillRef>
+          <a:effectRef idx="2">
+            <a:schemeClr val="accent1"/>
+          </a:effectRef>
+          <a:fontRef idx="minor">
+            <a:schemeClr val="lt1"/>
+          </a:fontRef>
+        </p:style>
+        <p:txBody>
+          <a:bodyPr rtlCol="0" anchor="ctr"/>
+          <a:lstStyle/>
+          <a:p>
+            <a:pPr algn="ctr"/>
+            <a:r>
+              <a:rPr sz="1600" b="1">
+                <a:solidFill>
+                  <a:srgbClr val="FFFFFF"/>
+                </a:solidFill>
+              </a:rPr>
+              <a:t>Training Accuracy</a:t>
+            </a:r>
+          </a:p>
+          <a:p>
+            <a:pPr algn="ctr"/>
+            <a:r>
+              <a:rPr sz="4800" b="1">
+                <a:solidFill>
+                  <a:srgbClr val="FFFFFF"/>
+                </a:solidFill>
+              </a:rPr>
+              <a:t>100%</a:t>
+            </a:r>
+          </a:p>
+        </p:txBody>
+      </p:sp>
+      <p:sp>
+        <p:nvSpPr>
+          <p:cNvPr id="4" name="Rounded Rectangle 3"/>
+          <p:cNvSpPr/>
+          <p:nvPr/>
+        </p:nvSpPr>
+        <p:spPr>
+          <a:xfrm>
+            <a:off x="3840480" y="1097280"/>
+            <a:ext cx="3657600" cy="1097280"/>
+          </a:xfrm>
+          <a:prstGeom prst="roundRect">
+            <a:avLst/>
+          </a:prstGeom>
+          <a:solidFill>
+            <a:srgbClr val="2196F3"/>
+          </a:solidFill>
+          <a:ln w="25400">
+            <a:solidFill>
+              <a:srgbClr val="1565C0"/>
+            </a:solidFill>
+          </a:ln>
+        </p:spPr>
+        <p:style>
+          <a:lnRef idx="1">
+            <a:schemeClr val="accent1"/>
+          </a:lnRef>
+          <a:fillRef idx="3">
+            <a:schemeClr val="accent1"/>
+          </a:fillRef>
+          <a:effectRef idx="2">
+            <a:schemeClr val="accent1"/>
+          </a:effectRef>
+          <a:fontRef idx="minor">
+            <a:schemeClr val="lt1"/>
+          </a:fontRef>
+        </p:style>
+        <p:txBody>
+          <a:bodyPr rtlCol="0" anchor="ctr"/>
+          <a:lstStyle/>
+          <a:p>
+            <a:pPr algn="ctr"/>
+            <a:r>
+              <a:rPr sz="1600" b="1">
+                <a:solidFill>
+                  <a:srgbClr val="FFFFFF"/>
+                </a:solidFill>
+              </a:rPr>
+              <a:t>Model Architecture</a:t>
+            </a:r>
+          </a:p>
+          <a:p>
+            <a:pPr algn="ctr"/>
+            <a:r>
+              <a:rPr sz="2400" b="1">
+                <a:solidFill>
+                  <a:srgbClr val="FFFFFF"/>
+                </a:solidFill>
+              </a:rPr>
+              <a:t>MobileNet v2</a:t>
+            </a:r>
+          </a:p>
+          <a:p>
+            <a:pPr algn="ctr"/>
+            <a:r>
+              <a:rPr sz="1400">
+                <a:solidFill>
+                  <a:srgbClr val="FFFFFF"/>
+                </a:solidFill>
+              </a:rPr>
+              <a:t>~3.5M parameters</a:t>
+            </a:r>
+          </a:p>
+        </p:txBody>
+      </p:sp>
+      <p:sp>
+        <p:nvSpPr>
+          <p:cNvPr id="5" name="Rounded Rectangle 4"/>
+          <p:cNvSpPr/>
+          <p:nvPr/>
+        </p:nvSpPr>
+        <p:spPr>
+          <a:xfrm>
+            <a:off x="7863840" y="1097280"/>
+            <a:ext cx="3200400" cy="1097280"/>
+          </a:xfrm>
+          <a:prstGeom prst="roundRect">
+            <a:avLst/>
+          </a:prstGeom>
+          <a:solidFill>
+            <a:srgbClr val="FF9800"/>
+          </a:solidFill>
+          <a:ln w="25400">
+            <a:solidFill>
+              <a:srgbClr val="E65100"/>
+            </a:solidFill>
+          </a:ln>
+        </p:spPr>
+        <p:style>
+          <a:lnRef idx="1">
+            <a:schemeClr val="accent1"/>
+          </a:lnRef>
+          <a:fillRef idx="3">
+            <a:schemeClr val="accent1"/>
+          </a:fillRef>
+          <a:effectRef idx="2">
+            <a:schemeClr val="accent1"/>
+          </a:effectRef>
+          <a:fontRef idx="minor">
+            <a:schemeClr val="lt1"/>
+          </a:fontRef>
+        </p:style>
+        <p:txBody>
+          <a:bodyPr rtlCol="0" anchor="ctr"/>
+          <a:lstStyle/>
+          <a:p>
+            <a:pPr algn="ctr"/>
+            <a:r>
+              <a:rPr sz="1600" b="1">
+                <a:solidFill>
+                  <a:srgbClr val="FFFFFF"/>
+                </a:solidFill>
+              </a:rPr>
+              <a:t>Verification Set</a:t>
+            </a:r>
+          </a:p>
+          <a:p>
+            <a:pPr algn="ctr"/>
+            <a:r>
+              <a:rPr sz="3600" b="1">
+                <a:solidFill>
+                  <a:srgbClr val="FFFFFF"/>
+                </a:solidFill>
+              </a:rPr>
+              <a:t>100% (4/4)</a:t>
+            </a:r>
+          </a:p>
+        </p:txBody>
+      </p:sp>
+      <p:sp>
+        <p:nvSpPr>
+          <p:cNvPr id="6" name="TextBox 5"/>
+          <p:cNvSpPr txBox="1"/>
+          <p:nvPr/>
+        </p:nvSpPr>
+        <p:spPr>
+          <a:xfrm>
+            <a:off x="731520" y="2377440"/>
+            <a:ext cx="10515600" cy="365760"/>
+          </a:xfrm>
+          <a:prstGeom prst="rect">
+            <a:avLst/>
+          </a:prstGeom>
+          <a:noFill/>
+        </p:spPr>
+        <p:txBody>
+          <a:bodyPr wrap="none">
+            <a:spAutoFit/>
+          </a:bodyPr>
+          <a:lstStyle/>
+          <a:p>
+            <a:pPr algn="l"/>
+            <a:r>
+              <a:rPr sz="1800" b="1">
+                <a:solidFill>
+                  <a:srgbClr val="003366"/>
+                </a:solidFill>
+              </a:rPr>
+              <a:t>Sample Predictions</a:t>
+            </a:r>
+          </a:p>
+        </p:txBody>
+      </p:sp>
+      <p:sp>
+        <p:nvSpPr>
+          <p:cNvPr id="7" name="TextBox 6"/>
+          <p:cNvSpPr txBox="1"/>
+          <p:nvPr/>
+        </p:nvSpPr>
+        <p:spPr>
+          <a:xfrm>
+            <a:off x="731520" y="2834640"/>
+            <a:ext cx="3200400" cy="457200"/>
+          </a:xfrm>
+          <a:prstGeom prst="rect">
+            <a:avLst/>
+          </a:prstGeom>
+          <a:noFill/>
+        </p:spPr>
+        <p:txBody>
+          <a:bodyPr wrap="none" anchor="ctr">
+            <a:spAutoFit/>
+          </a:bodyPr>
+          <a:lstStyle/>
+          <a:p>
+            <a:r>
+              <a:rPr sz="1100"/>
+              <a:t>cooking-pot_normal_01.jpg</a:t>
+            </a:r>
+          </a:p>
+        </p:txBody>
+      </p:sp>
+      <p:sp>
+        <p:nvSpPr>
+          <p:cNvPr id="8" name="TextBox 7"/>
+          <p:cNvSpPr txBox="1"/>
+          <p:nvPr/>
+        </p:nvSpPr>
+        <p:spPr>
+          <a:xfrm>
+            <a:off x="4114800" y="2834640"/>
+            <a:ext cx="1828800" cy="457200"/>
+          </a:xfrm>
+          <a:prstGeom prst="rect">
+            <a:avLst/>
+          </a:prstGeom>
+          <a:noFill/>
+        </p:spPr>
+        <p:txBody>
+          <a:bodyPr wrap="none" anchor="ctr">
+            <a:spAutoFit/>
+          </a:bodyPr>
+          <a:lstStyle/>
+          <a:p>
+            <a:r>
+              <a:rPr sz="1200" b="1"/>
+              <a:t>Pred: normal</a:t>
+            </a:r>
+          </a:p>
+        </p:txBody>
+      </p:sp>
+      <p:sp>
+        <p:nvSpPr>
+          <p:cNvPr id="9" name="TextBox 8"/>
+          <p:cNvSpPr txBox="1"/>
+          <p:nvPr/>
+        </p:nvSpPr>
+        <p:spPr>
+          <a:xfrm>
+            <a:off x="6126480" y="2834640"/>
+            <a:ext cx="1371600" cy="457200"/>
+          </a:xfrm>
+          <a:prstGeom prst="rect">
+            <a:avLst/>
+          </a:prstGeom>
+          <a:noFill/>
+        </p:spPr>
+        <p:txBody>
+          <a:bodyPr wrap="none" anchor="ctr">
+            <a:spAutoFit/>
+          </a:bodyPr>
+          <a:lstStyle/>
+          <a:p>
+            <a:pPr algn="ctr"/>
+            <a:r>
+              <a:rPr sz="1200"/>
+              <a:t>36.2%</a:t>
+            </a:r>
+          </a:p>
+        </p:txBody>
+      </p:sp>
+      <p:sp>
+        <p:nvSpPr>
+          <p:cNvPr id="10" name="TextBox 9"/>
+          <p:cNvSpPr txBox="1"/>
+          <p:nvPr/>
+        </p:nvSpPr>
+        <p:spPr>
+          <a:xfrm>
+            <a:off x="7680960" y="2834640"/>
+            <a:ext cx="548640" cy="457200"/>
+          </a:xfrm>
+          <a:prstGeom prst="rect">
+            <a:avLst/>
+          </a:prstGeom>
+          <a:noFill/>
+        </p:spPr>
+        <p:txBody>
+          <a:bodyPr wrap="none" anchor="ctr">
+            <a:spAutoFit/>
+          </a:bodyPr>
+          <a:lstStyle/>
+          <a:p>
+            <a:pPr algn="ctr"/>
+            <a:r>
+              <a:rPr sz="2000" b="1">
+                <a:solidFill>
+                  <a:srgbClr val="4CAF50"/>
+                </a:solidFill>
+              </a:rPr>
+              <a:t>✓</a:t>
+            </a:r>
+          </a:p>
+        </p:txBody>
+      </p:sp>
+      <p:sp>
+        <p:nvSpPr>
+          <p:cNvPr id="11" name="TextBox 10"/>
+          <p:cNvSpPr txBox="1"/>
+          <p:nvPr/>
+        </p:nvSpPr>
+        <p:spPr>
+          <a:xfrm>
+            <a:off x="731520" y="3383280"/>
+            <a:ext cx="3200400" cy="457200"/>
+          </a:xfrm>
+          <a:prstGeom prst="rect">
+            <a:avLst/>
+          </a:prstGeom>
+          <a:noFill/>
+        </p:spPr>
+        <p:txBody>
+          <a:bodyPr wrap="none" anchor="ctr">
+            <a:spAutoFit/>
+          </a:bodyPr>
+          <a:lstStyle/>
+          <a:p>
+            <a:r>
+              <a:rPr sz="1100"/>
+              <a:t>frying-pan_boiling_01.jpg</a:t>
+            </a:r>
+          </a:p>
+        </p:txBody>
+      </p:sp>
+      <p:sp>
+        <p:nvSpPr>
+          <p:cNvPr id="12" name="TextBox 11"/>
+          <p:cNvSpPr txBox="1"/>
+          <p:nvPr/>
+        </p:nvSpPr>
+        <p:spPr>
+          <a:xfrm>
+            <a:off x="4114800" y="3383280"/>
+            <a:ext cx="1828800" cy="457200"/>
+          </a:xfrm>
+          <a:prstGeom prst="rect">
+            <a:avLst/>
+          </a:prstGeom>
+          <a:noFill/>
+        </p:spPr>
+        <p:txBody>
+          <a:bodyPr wrap="none" anchor="ctr">
+            <a:spAutoFit/>
+          </a:bodyPr>
+          <a:lstStyle/>
+          <a:p>
+            <a:r>
+              <a:rPr sz="1200" b="1"/>
+              <a:t>Pred: boiling</a:t>
+            </a:r>
+          </a:p>
+        </p:txBody>
+      </p:sp>
+      <p:sp>
+        <p:nvSpPr>
+          <p:cNvPr id="13" name="TextBox 12"/>
+          <p:cNvSpPr txBox="1"/>
+          <p:nvPr/>
+        </p:nvSpPr>
+        <p:spPr>
+          <a:xfrm>
+            <a:off x="6126480" y="3383280"/>
+            <a:ext cx="1371600" cy="457200"/>
+          </a:xfrm>
+          <a:prstGeom prst="rect">
+            <a:avLst/>
+          </a:prstGeom>
+          <a:noFill/>
+        </p:spPr>
+        <p:txBody>
+          <a:bodyPr wrap="none" anchor="ctr">
+            <a:spAutoFit/>
+          </a:bodyPr>
+          <a:lstStyle/>
+          <a:p>
+            <a:pPr algn="ctr"/>
+            <a:r>
+              <a:rPr sz="1200"/>
+              <a:t>66.5%</a:t>
+            </a:r>
+          </a:p>
+        </p:txBody>
+      </p:sp>
+      <p:sp>
+        <p:nvSpPr>
+          <p:cNvPr id="14" name="TextBox 13"/>
+          <p:cNvSpPr txBox="1"/>
+          <p:nvPr/>
+        </p:nvSpPr>
+        <p:spPr>
+          <a:xfrm>
+            <a:off x="7680960" y="3383280"/>
+            <a:ext cx="548640" cy="457200"/>
+          </a:xfrm>
+          <a:prstGeom prst="rect">
+            <a:avLst/>
+          </a:prstGeom>
+          <a:noFill/>
+        </p:spPr>
+        <p:txBody>
+          <a:bodyPr wrap="none" anchor="ctr">
+            <a:spAutoFit/>
+          </a:bodyPr>
+          <a:lstStyle/>
+          <a:p>
+            <a:pPr algn="ctr"/>
+            <a:r>
+              <a:rPr sz="2000" b="1">
+                <a:solidFill>
+                  <a:srgbClr val="4CAF50"/>
+                </a:solidFill>
+              </a:rPr>
+              <a:t>✓</a:t>
+            </a:r>
+          </a:p>
+        </p:txBody>
+      </p:sp>
+      <p:sp>
+        <p:nvSpPr>
+          <p:cNvPr id="15" name="TextBox 14"/>
+          <p:cNvSpPr txBox="1"/>
+          <p:nvPr/>
+        </p:nvSpPr>
+        <p:spPr>
+          <a:xfrm>
+            <a:off x="731520" y="3931920"/>
+            <a:ext cx="3200400" cy="457200"/>
+          </a:xfrm>
+          <a:prstGeom prst="rect">
+            <a:avLst/>
+          </a:prstGeom>
+          <a:noFill/>
+        </p:spPr>
+        <p:txBody>
+          <a:bodyPr wrap="none" anchor="ctr">
+            <a:spAutoFit/>
+          </a:bodyPr>
+          <a:lstStyle/>
+          <a:p>
+            <a:r>
+              <a:rPr sz="1100"/>
+              <a:t>frying-pan_on-fire_01.jpg</a:t>
+            </a:r>
+          </a:p>
+        </p:txBody>
+      </p:sp>
+      <p:sp>
+        <p:nvSpPr>
+          <p:cNvPr id="16" name="TextBox 15"/>
+          <p:cNvSpPr txBox="1"/>
+          <p:nvPr/>
+        </p:nvSpPr>
+        <p:spPr>
+          <a:xfrm>
+            <a:off x="4114800" y="3931920"/>
+            <a:ext cx="1828800" cy="457200"/>
+          </a:xfrm>
+          <a:prstGeom prst="rect">
+            <a:avLst/>
+          </a:prstGeom>
+          <a:noFill/>
+        </p:spPr>
+        <p:txBody>
+          <a:bodyPr wrap="none" anchor="ctr">
+            <a:spAutoFit/>
+          </a:bodyPr>
+          <a:lstStyle/>
+          <a:p>
+            <a:r>
+              <a:rPr sz="1200" b="1"/>
+              <a:t>Pred: on_fire</a:t>
+            </a:r>
+          </a:p>
+        </p:txBody>
+      </p:sp>
+      <p:sp>
+        <p:nvSpPr>
+          <p:cNvPr id="17" name="TextBox 16"/>
+          <p:cNvSpPr txBox="1"/>
+          <p:nvPr/>
+        </p:nvSpPr>
+        <p:spPr>
+          <a:xfrm>
+            <a:off x="6126480" y="3931920"/>
+            <a:ext cx="1371600" cy="457200"/>
+          </a:xfrm>
+          <a:prstGeom prst="rect">
+            <a:avLst/>
+          </a:prstGeom>
+          <a:noFill/>
+        </p:spPr>
+        <p:txBody>
+          <a:bodyPr wrap="none" anchor="ctr">
+            <a:spAutoFit/>
+          </a:bodyPr>
+          <a:lstStyle/>
+          <a:p>
+            <a:pPr algn="ctr"/>
+            <a:r>
+              <a:rPr sz="1200"/>
+              <a:t>54.3%</a:t>
+            </a:r>
+          </a:p>
+        </p:txBody>
+      </p:sp>
+      <p:sp>
+        <p:nvSpPr>
+          <p:cNvPr id="18" name="TextBox 17"/>
+          <p:cNvSpPr txBox="1"/>
+          <p:nvPr/>
+        </p:nvSpPr>
+        <p:spPr>
+          <a:xfrm>
+            <a:off x="7680960" y="3931920"/>
+            <a:ext cx="548640" cy="457200"/>
+          </a:xfrm>
+          <a:prstGeom prst="rect">
+            <a:avLst/>
+          </a:prstGeom>
+          <a:noFill/>
+        </p:spPr>
+        <p:txBody>
+          <a:bodyPr wrap="none" anchor="ctr">
+            <a:spAutoFit/>
+          </a:bodyPr>
+          <a:lstStyle/>
+          <a:p>
+            <a:pPr algn="ctr"/>
+            <a:r>
+              <a:rPr sz="2000" b="1">
+                <a:solidFill>
+                  <a:srgbClr val="4CAF50"/>
+                </a:solidFill>
+              </a:rPr>
+              <a:t>✓</a:t>
+            </a:r>
+          </a:p>
+        </p:txBody>
+      </p:sp>
+      <p:sp>
+        <p:nvSpPr>
+          <p:cNvPr id="19" name="TextBox 18"/>
+          <p:cNvSpPr txBox="1"/>
+          <p:nvPr/>
+        </p:nvSpPr>
+        <p:spPr>
+          <a:xfrm>
+            <a:off x="731520" y="4480560"/>
+            <a:ext cx="3200400" cy="457200"/>
+          </a:xfrm>
+          <a:prstGeom prst="rect">
+            <a:avLst/>
+          </a:prstGeom>
+          <a:noFill/>
+        </p:spPr>
+        <p:txBody>
+          <a:bodyPr wrap="none" anchor="ctr">
+            <a:spAutoFit/>
+          </a:bodyPr>
+          <a:lstStyle/>
+          <a:p>
+            <a:r>
+              <a:rPr sz="1100"/>
+              <a:t>frying-pan_smoking_01.jpg</a:t>
+            </a:r>
+          </a:p>
+        </p:txBody>
+      </p:sp>
+      <p:sp>
+        <p:nvSpPr>
+          <p:cNvPr id="20" name="TextBox 19"/>
+          <p:cNvSpPr txBox="1"/>
+          <p:nvPr/>
+        </p:nvSpPr>
+        <p:spPr>
+          <a:xfrm>
+            <a:off x="4114800" y="4480560"/>
+            <a:ext cx="1828800" cy="457200"/>
+          </a:xfrm>
+          <a:prstGeom prst="rect">
+            <a:avLst/>
+          </a:prstGeom>
+          <a:noFill/>
+        </p:spPr>
+        <p:txBody>
+          <a:bodyPr wrap="none" anchor="ctr">
+            <a:spAutoFit/>
+          </a:bodyPr>
+          <a:lstStyle/>
+          <a:p>
+            <a:r>
+              <a:rPr sz="1200" b="1"/>
+              <a:t>Pred: smoking</a:t>
+            </a:r>
+          </a:p>
+        </p:txBody>
+      </p:sp>
+      <p:sp>
+        <p:nvSpPr>
+          <p:cNvPr id="21" name="TextBox 20"/>
+          <p:cNvSpPr txBox="1"/>
+          <p:nvPr/>
+        </p:nvSpPr>
+        <p:spPr>
+          <a:xfrm>
+            <a:off x="6126480" y="4480560"/>
+            <a:ext cx="1371600" cy="457200"/>
+          </a:xfrm>
+          <a:prstGeom prst="rect">
+            <a:avLst/>
+          </a:prstGeom>
+          <a:noFill/>
+        </p:spPr>
+        <p:txBody>
+          <a:bodyPr wrap="none" anchor="ctr">
+            <a:spAutoFit/>
+          </a:bodyPr>
+          <a:lstStyle/>
+          <a:p>
+            <a:pPr algn="ctr"/>
+            <a:r>
+              <a:rPr sz="1200"/>
+              <a:t>42.8%</a:t>
+            </a:r>
+          </a:p>
+        </p:txBody>
+      </p:sp>
+      <p:sp>
+        <p:nvSpPr>
+          <p:cNvPr id="22" name="TextBox 21"/>
+          <p:cNvSpPr txBox="1"/>
+          <p:nvPr/>
+        </p:nvSpPr>
+        <p:spPr>
+          <a:xfrm>
+            <a:off x="7680960" y="4480560"/>
+            <a:ext cx="548640" cy="457200"/>
+          </a:xfrm>
+          <a:prstGeom prst="rect">
+            <a:avLst/>
+          </a:prstGeom>
+          <a:noFill/>
+        </p:spPr>
+        <p:txBody>
+          <a:bodyPr wrap="none" anchor="ctr">
+            <a:spAutoFit/>
+          </a:bodyPr>
+          <a:lstStyle/>
+          <a:p>
+            <a:pPr algn="ctr"/>
+            <a:r>
+              <a:rPr sz="2000" b="1">
+                <a:solidFill>
+                  <a:srgbClr val="4CAF50"/>
+                </a:solidFill>
+              </a:rPr>
+              <a:t>✓</a:t>
+            </a:r>
+          </a:p>
+        </p:txBody>
+      </p:sp>
+    </p:spTree>
+  </p:cSld>
+  <p:clrMapOvr>
+    <a:masterClrMapping/>
+  </p:clrMapOvr>
+</p:sld>
+</file>
+
+<file path=ppt/slides/slide6.xml><?xml version="1.0" encoding="utf-8"?>
+<p:sld xmlns:a="http://schemas.openxmlformats.org/drawingml/2006/main" xmlns:p="http://schemas.openxmlformats.org/presentationml/2006/main" xmlns:r="http://schemas.openxmlformats.org/officeDocument/2006/relationships">
+  <p:cSld>
+    <p:bg>
+      <p:bgPr>
+        <a:solidFill>
+          <a:srgbClr val="FAFAFA"/>
+        </a:solidFill>
+        <a:effectLst/>
+      </p:bgPr>
+    </p:bg>
+    <p:spTree>
+      <p:nvGrpSpPr>
+        <p:cNvPr id="1" name=""/>
+        <p:cNvGrpSpPr/>
+        <p:nvPr/>
+      </p:nvGrpSpPr>
+      <p:grpSpPr/>
+      <p:sp>
+        <p:nvSpPr>
+          <p:cNvPr id="2" name="TextBox 1"/>
+          <p:cNvSpPr txBox="1"/>
+          <p:nvPr/>
+        </p:nvSpPr>
+        <p:spPr>
+          <a:xfrm>
+            <a:off x="457200" y="274320"/>
+            <a:ext cx="11274552" cy="548640"/>
+          </a:xfrm>
+          <a:prstGeom prst="rect">
+            <a:avLst/>
+          </a:prstGeom>
+          <a:noFill/>
+        </p:spPr>
+        <p:txBody>
+          <a:bodyPr wrap="none">
+            <a:spAutoFit/>
+          </a:bodyPr>
+          <a:lstStyle/>
+          <a:p>
+            <a:pPr algn="ctr"/>
+            <a:r>
+              <a:rPr sz="3200" b="1">
+                <a:solidFill>
+                  <a:srgbClr val="003366"/>
+                </a:solidFill>
+              </a:rPr>
+              <a:t>Marked Detection Results</a:t>
+            </a:r>
+          </a:p>
+        </p:txBody>
+      </p:sp>
+      <p:pic>
+        <p:nvPicPr>
+          <p:cNvPr id="3" name="Picture 2" descr="cooking-pot_normal_01_marked.jpg"/>
+          <p:cNvPicPr>
+            <a:picLocks noChangeAspect="1"/>
+          </p:cNvPicPr>
+          <p:nvPr/>
+        </p:nvPicPr>
+        <p:blipFill>
+          <a:blip r:embed="rId2"/>
+          <a:stretch>
+            <a:fillRect/>
+          </a:stretch>
+        </p:blipFill>
+        <p:spPr>
+          <a:xfrm>
+            <a:off x="731520" y="1097280"/>
+            <a:ext cx="2725337" cy="2377440"/>
+          </a:xfrm>
+          <a:prstGeom prst="rect">
+            <a:avLst/>
+          </a:prstGeom>
+        </p:spPr>
+      </p:pic>
+      <p:sp>
+        <p:nvSpPr>
+          <p:cNvPr id="4" name="TextBox 3"/>
+          <p:cNvSpPr txBox="1"/>
+          <p:nvPr/>
+        </p:nvSpPr>
+        <p:spPr>
+          <a:xfrm>
+            <a:off x="731520" y="3520440"/>
+            <a:ext cx="2725337" cy="274320"/>
+          </a:xfrm>
+          <a:prstGeom prst="rect">
+            <a:avLst/>
+          </a:prstGeom>
+          <a:noFill/>
+        </p:spPr>
+        <p:txBody>
+          <a:bodyPr wrap="none">
+            <a:spAutoFit/>
+          </a:bodyPr>
+          <a:lstStyle/>
+          <a:p>
+            <a:pPr algn="ctr"/>
+            <a:r>
+              <a:rPr sz="1000">
+                <a:solidFill>
+                  <a:srgbClr val="505050"/>
+                </a:solidFill>
+              </a:rPr>
+              <a:t>cooking-pot normal 01</a:t>
+            </a:r>
+          </a:p>
+        </p:txBody>
+      </p:sp>
+      <p:pic>
+        <p:nvPicPr>
+          <p:cNvPr id="5" name="Picture 4" descr="frying-pan_boiling_01_marked.jpg"/>
+          <p:cNvPicPr>
+            <a:picLocks noChangeAspect="1"/>
+          </p:cNvPicPr>
+          <p:nvPr/>
+        </p:nvPicPr>
+        <p:blipFill>
+          <a:blip r:embed="rId3"/>
+          <a:stretch>
+            <a:fillRect/>
+          </a:stretch>
+        </p:blipFill>
+        <p:spPr>
+          <a:xfrm>
+            <a:off x="6583680" y="1097280"/>
+            <a:ext cx="2725337" cy="2377440"/>
+          </a:xfrm>
+          <a:prstGeom prst="rect">
+            <a:avLst/>
+          </a:prstGeom>
+        </p:spPr>
+      </p:pic>
+      <p:sp>
+        <p:nvSpPr>
+          <p:cNvPr id="6" name="TextBox 5"/>
+          <p:cNvSpPr txBox="1"/>
+          <p:nvPr/>
+        </p:nvSpPr>
+        <p:spPr>
+          <a:xfrm>
+            <a:off x="6583680" y="3520440"/>
+            <a:ext cx="2725337" cy="274320"/>
+          </a:xfrm>
+          <a:prstGeom prst="rect">
+            <a:avLst/>
+          </a:prstGeom>
+          <a:noFill/>
+        </p:spPr>
+        <p:txBody>
+          <a:bodyPr wrap="none">
+            <a:spAutoFit/>
+          </a:bodyPr>
+          <a:lstStyle/>
+          <a:p>
+            <a:pPr algn="ctr"/>
+            <a:r>
+              <a:rPr sz="1000">
+                <a:solidFill>
+                  <a:srgbClr val="505050"/>
+                </a:solidFill>
+              </a:rPr>
+              <a:t>frying-pan boiling 01</a:t>
+            </a:r>
+          </a:p>
+        </p:txBody>
+      </p:sp>
+      <p:pic>
+        <p:nvPicPr>
+          <p:cNvPr id="7" name="Picture 6" descr="frying-pan_on-fire_01_marked.jpg"/>
+          <p:cNvPicPr>
+            <a:picLocks noChangeAspect="1"/>
+          </p:cNvPicPr>
+          <p:nvPr/>
+        </p:nvPicPr>
+        <p:blipFill>
+          <a:blip r:embed="rId4"/>
+          <a:stretch>
+            <a:fillRect/>
+          </a:stretch>
+        </p:blipFill>
+        <p:spPr>
+          <a:xfrm>
+            <a:off x="731520" y="3840480"/>
+            <a:ext cx="2725337" cy="2377440"/>
+          </a:xfrm>
+          <a:prstGeom prst="rect">
+            <a:avLst/>
+          </a:prstGeom>
+        </p:spPr>
+      </p:pic>
+      <p:sp>
+        <p:nvSpPr>
+          <p:cNvPr id="8" name="TextBox 7"/>
+          <p:cNvSpPr txBox="1"/>
+          <p:nvPr/>
+        </p:nvSpPr>
+        <p:spPr>
+          <a:xfrm>
+            <a:off x="731520" y="6263640"/>
+            <a:ext cx="2725337" cy="274320"/>
+          </a:xfrm>
+          <a:prstGeom prst="rect">
+            <a:avLst/>
+          </a:prstGeom>
+          <a:noFill/>
+        </p:spPr>
+        <p:txBody>
+          <a:bodyPr wrap="none">
+            <a:spAutoFit/>
+          </a:bodyPr>
+          <a:lstStyle/>
+          <a:p>
+            <a:pPr algn="ctr"/>
+            <a:r>
+              <a:rPr sz="1000">
+                <a:solidFill>
+                  <a:srgbClr val="505050"/>
+                </a:solidFill>
+              </a:rPr>
+              <a:t>frying-pan on-fire 01</a:t>
+            </a:r>
+          </a:p>
+        </p:txBody>
+      </p:sp>
+      <p:pic>
+        <p:nvPicPr>
+          <p:cNvPr id="9" name="Picture 8" descr="frying-pan_smoking_01_marked.jpg"/>
+          <p:cNvPicPr>
+            <a:picLocks noChangeAspect="1"/>
+          </p:cNvPicPr>
+          <p:nvPr/>
+        </p:nvPicPr>
+        <p:blipFill>
+          <a:blip r:embed="rId5"/>
+          <a:stretch>
+            <a:fillRect/>
+          </a:stretch>
+        </p:blipFill>
+        <p:spPr>
+          <a:xfrm>
+            <a:off x="6583680" y="3840480"/>
+            <a:ext cx="2725337" cy="2377440"/>
+          </a:xfrm>
+          <a:prstGeom prst="rect">
+            <a:avLst/>
+          </a:prstGeom>
+        </p:spPr>
+      </p:pic>
+      <p:sp>
+        <p:nvSpPr>
+          <p:cNvPr id="10" name="TextBox 9"/>
+          <p:cNvSpPr txBox="1"/>
+          <p:nvPr/>
+        </p:nvSpPr>
+        <p:spPr>
+          <a:xfrm>
+            <a:off x="6583680" y="6263640"/>
+            <a:ext cx="2725337" cy="274320"/>
+          </a:xfrm>
+          <a:prstGeom prst="rect">
+            <a:avLst/>
+          </a:prstGeom>
+          <a:noFill/>
+        </p:spPr>
+        <p:txBody>
+          <a:bodyPr wrap="none">
+            <a:spAutoFit/>
+          </a:bodyPr>
+          <a:lstStyle/>
+          <a:p>
+            <a:pPr algn="ctr"/>
+            <a:r>
+              <a:rPr sz="1000">
+                <a:solidFill>
+                  <a:srgbClr val="505050"/>
+                </a:solidFill>
+              </a:rPr>
+              <a:t>frying-pan smoking 01</a:t>
             </a:r>
           </a:p>
         </p:txBody>

</xml_diff>

<commit_message>
# Fine-tune The Bounding Areas Detection
1. As title
</commit_message>
<xml_diff>
--- a/Kitchen_Assist_Workflow.pptx
+++ b/Kitchen_Assist_Workflow.pptx
@@ -3213,7 +3213,7 @@
                   <a:srgbClr val="FFFFFF"/>
                 </a:solidFill>
               </a:rPr>
-              <a:t>100% Training Accuracy</a:t>
+              <a:t>100% Training &amp; Verification</a:t>
             </a:r>
           </a:p>
         </p:txBody>
@@ -3262,7 +3262,7 @@
                   <a:srgbClr val="FFFFFF"/>
                 </a:solidFill>
               </a:rPr>
-              <a:t>MobileNet v2 - 3.5M Params</a:t>
+              <a:t>Hybrid Circle + YOLO Detection</a:t>
             </a:r>
           </a:p>
         </p:txBody>
@@ -3311,7 +3311,7 @@
                   <a:srgbClr val="FFFFFF"/>
                 </a:solidFill>
               </a:rPr>
-              <a:t>Color-Optimized Detection</a:t>
+              <a:t>MobileNet v2 - 3.5M Params</a:t>
             </a:r>
           </a:p>
         </p:txBody>
@@ -3499,7 +3499,7 @@
                   <a:srgbClr val="FFFFFF"/>
                 </a:solidFill>
               </a:rPr>
-              <a:t>(YOLO v8)</a:t>
+              <a:t>(Circle + YOLO)</a:t>
             </a:r>
           </a:p>
         </p:txBody>
@@ -4826,7 +4826,7 @@
                   <a:srgbClr val="003366"/>
                 </a:solidFill>
               </a:rPr>
-              <a:t>🎯 Automatic Detection</a:t>
+              <a:t>🎯 Hybrid Detection</a:t>
             </a:r>
           </a:p>
           <a:p>
@@ -4837,7 +4837,7 @@
                   <a:srgbClr val="3C3C3C"/>
                 </a:solidFill>
               </a:rPr>
-              <a:t>YOLO v8 for pan/pot localization</a:t>
+              <a:t>Circle detection + YOLO v8 fallback</a:t>
             </a:r>
           </a:p>
         </p:txBody>
@@ -4965,7 +4965,7 @@
                   <a:srgbClr val="3C3C3C"/>
                 </a:solidFill>
               </a:rPr>
-              <a:t>100% on training set</a:t>
+              <a:t>100% training &amp; verification</a:t>
             </a:r>
           </a:p>
         </p:txBody>
@@ -5018,7 +5018,7 @@
                   <a:srgbClr val="003366"/>
                 </a:solidFill>
               </a:rPr>
-              <a:t>🖼️ Visual Feedback</a:t>
+              <a:t>🖼️ Accurate Wireframes</a:t>
             </a:r>
           </a:p>
           <a:p>
@@ -5029,7 +5029,7 @@
                   <a:srgbClr val="3C3C3C"/>
                 </a:solidFill>
               </a:rPr>
-              <a:t>Green wireframe marking</a:t>
+              <a:t>Tight fit around circular cookware</a:t>
             </a:r>
           </a:p>
         </p:txBody>

</xml_diff>